<commit_message>
minor changes to presentation slide titles
</commit_message>
<xml_diff>
--- a/project_1/Project_1_Presentation.pptx
+++ b/project_1/Project_1_Presentation.pptx
@@ -3137,7 +3137,7 @@
           <a:p>
             <a:fld id="{EED1C14C-A143-42F5-B247-D0E800131009}" type="datetimeFigureOut">
               <a:rPr lang="en-US" smtClean="0"/>
-              <a:t>5/30/2021</a:t>
+              <a:t>5/31/2021</a:t>
             </a:fld>
             <a:endParaRPr lang="en-US"/>
           </a:p>
@@ -3345,7 +3345,7 @@
           <a:p>
             <a:fld id="{EED1C14C-A143-42F5-B247-D0E800131009}" type="datetimeFigureOut">
               <a:rPr lang="en-US" smtClean="0"/>
-              <a:t>5/30/2021</a:t>
+              <a:t>5/31/2021</a:t>
             </a:fld>
             <a:endParaRPr lang="en-US"/>
           </a:p>
@@ -3603,7 +3603,7 @@
           <a:p>
             <a:fld id="{EED1C14C-A143-42F5-B247-D0E800131009}" type="datetimeFigureOut">
               <a:rPr lang="en-US" smtClean="0"/>
-              <a:t>5/30/2021</a:t>
+              <a:t>5/31/2021</a:t>
             </a:fld>
             <a:endParaRPr lang="en-US"/>
           </a:p>
@@ -3773,7 +3773,7 @@
           <a:p>
             <a:fld id="{EED1C14C-A143-42F5-B247-D0E800131009}" type="datetimeFigureOut">
               <a:rPr lang="en-US" smtClean="0"/>
-              <a:t>5/30/2021</a:t>
+              <a:t>5/31/2021</a:t>
             </a:fld>
             <a:endParaRPr lang="en-US"/>
           </a:p>
@@ -4110,7 +4110,7 @@
           <a:p>
             <a:fld id="{EED1C14C-A143-42F5-B247-D0E800131009}" type="datetimeFigureOut">
               <a:rPr lang="en-US" smtClean="0"/>
-              <a:t>5/30/2021</a:t>
+              <a:t>5/31/2021</a:t>
             </a:fld>
             <a:endParaRPr lang="en-US"/>
           </a:p>
@@ -4385,7 +4385,7 @@
           <a:p>
             <a:fld id="{EED1C14C-A143-42F5-B247-D0E800131009}" type="datetimeFigureOut">
               <a:rPr lang="en-US" smtClean="0"/>
-              <a:t>5/30/2021</a:t>
+              <a:t>5/31/2021</a:t>
             </a:fld>
             <a:endParaRPr lang="en-US"/>
           </a:p>
@@ -4764,7 +4764,7 @@
           <a:p>
             <a:fld id="{EED1C14C-A143-42F5-B247-D0E800131009}" type="datetimeFigureOut">
               <a:rPr lang="en-US" smtClean="0"/>
-              <a:t>5/30/2021</a:t>
+              <a:t>5/31/2021</a:t>
             </a:fld>
             <a:endParaRPr lang="en-US"/>
           </a:p>
@@ -4882,7 +4882,7 @@
           <a:p>
             <a:fld id="{EED1C14C-A143-42F5-B247-D0E800131009}" type="datetimeFigureOut">
               <a:rPr lang="en-US" smtClean="0"/>
-              <a:t>5/30/2021</a:t>
+              <a:t>5/31/2021</a:t>
             </a:fld>
             <a:endParaRPr lang="en-US"/>
           </a:p>
@@ -5055,7 +5055,7 @@
           <a:p>
             <a:fld id="{EED1C14C-A143-42F5-B247-D0E800131009}" type="datetimeFigureOut">
               <a:rPr lang="en-US" smtClean="0"/>
-              <a:t>5/30/2021</a:t>
+              <a:t>5/31/2021</a:t>
             </a:fld>
             <a:endParaRPr lang="en-US"/>
           </a:p>
@@ -5411,7 +5411,7 @@
           <a:p>
             <a:fld id="{EED1C14C-A143-42F5-B247-D0E800131009}" type="datetimeFigureOut">
               <a:rPr lang="en-US" smtClean="0"/>
-              <a:t>5/30/2021</a:t>
+              <a:t>5/31/2021</a:t>
             </a:fld>
             <a:endParaRPr lang="en-US"/>
           </a:p>
@@ -5790,7 +5790,7 @@
           <a:p>
             <a:fld id="{EED1C14C-A143-42F5-B247-D0E800131009}" type="datetimeFigureOut">
               <a:rPr lang="en-US" smtClean="0"/>
-              <a:t>5/30/2021</a:t>
+              <a:t>5/31/2021</a:t>
             </a:fld>
             <a:endParaRPr lang="en-US"/>
           </a:p>
@@ -6079,7 +6079,7 @@
           <a:p>
             <a:fld id="{EED1C14C-A143-42F5-B247-D0E800131009}" type="datetimeFigureOut">
               <a:rPr lang="en-US" smtClean="0"/>
-              <a:t>5/30/2021</a:t>
+              <a:t>5/31/2021</a:t>
             </a:fld>
             <a:endParaRPr lang="en-US"/>
           </a:p>
@@ -7189,7 +7189,7 @@
           <p:nvPr>
             <p:extLst>
               <p:ext uri="{D42A27DB-BD31-4B8C-83A1-F6EECF244321}">
-                <p14:modId xmlns:p14="http://schemas.microsoft.com/office/powerpoint/2010/main" val="1656186491"/>
+                <p14:modId xmlns:p14="http://schemas.microsoft.com/office/powerpoint/2010/main" val="473876104"/>
               </p:ext>
             </p:extLst>
           </p:nvPr>
@@ -7236,7 +7236,7 @@
                       <a:pPr algn="l"/>
                       <a:r>
                         <a:rPr lang="en-SG" dirty="0"/>
-                        <a:t>South Carolina</a:t>
+                        <a:t>West Virginia</a:t>
                       </a:r>
                     </a:p>
                   </a:txBody>
@@ -7509,7 +7509,7 @@
           <p:nvPr>
             <p:extLst>
               <p:ext uri="{D42A27DB-BD31-4B8C-83A1-F6EECF244321}">
-                <p14:modId xmlns:p14="http://schemas.microsoft.com/office/powerpoint/2010/main" val="152767386"/>
+                <p14:modId xmlns:p14="http://schemas.microsoft.com/office/powerpoint/2010/main" val="1095829647"/>
               </p:ext>
             </p:extLst>
           </p:nvPr>
@@ -7555,9 +7555,10 @@
                     <a:p>
                       <a:pPr algn="l"/>
                       <a:r>
-                        <a:rPr lang="en-SG" dirty="0"/>
-                        <a:t>South Carolina</a:t>
+                        <a:rPr lang="en-SG"/>
+                        <a:t>Alaska</a:t>
                       </a:r>
+                      <a:endParaRPr lang="en-SG" dirty="0"/>
                     </a:p>
                   </a:txBody>
                   <a:tcPr/>
@@ -8359,7 +8360,7 @@
       </p:sp>
       <p:pic>
         <p:nvPicPr>
-          <p:cNvPr id="9" name="Picture 8" descr="Chart&#10;&#10;Description automatically generated">
+          <p:cNvPr id="9" name="Picture 8">
             <a:extLst>
               <a:ext uri="{FF2B5EF4-FFF2-40B4-BE49-F238E27FC236}">
                 <a16:creationId xmlns:a16="http://schemas.microsoft.com/office/drawing/2014/main" id="{8B568D1E-D256-4DEF-B04D-1AA9C7664DA9}"/>
@@ -8371,7 +8372,7 @@
           </p:cNvPicPr>
           <p:nvPr/>
         </p:nvPicPr>
-        <p:blipFill rotWithShape="1">
+        <p:blipFill>
           <a:blip r:embed="rId2">
             <a:extLst>
               <a:ext uri="{28A0092B-C50C-407E-A947-70E740481C1C}">
@@ -8379,7 +8380,7 @@
               </a:ext>
             </a:extLst>
           </a:blip>
-          <a:srcRect t="15451" r="-1" b="-1"/>
+          <a:srcRect t="4346" b="4346"/>
           <a:stretch/>
         </p:blipFill>
         <p:spPr>

</xml_diff>